<commit_message>
Add Merge Sort Slides
</commit_message>
<xml_diff>
--- a/Insertion and Merge Sort.pptx
+++ b/Insertion and Merge Sort.pptx
@@ -21,12 +21,13 @@
     <p:sldId id="289" r:id="rId15"/>
     <p:sldId id="272" r:id="rId16"/>
     <p:sldId id="274" r:id="rId17"/>
-    <p:sldId id="276" r:id="rId18"/>
-    <p:sldId id="277" r:id="rId19"/>
-    <p:sldId id="275" r:id="rId20"/>
-    <p:sldId id="273" r:id="rId21"/>
-    <p:sldId id="278" r:id="rId22"/>
-    <p:sldId id="290" r:id="rId23"/>
+    <p:sldId id="291" r:id="rId18"/>
+    <p:sldId id="276" r:id="rId19"/>
+    <p:sldId id="277" r:id="rId20"/>
+    <p:sldId id="275" r:id="rId21"/>
+    <p:sldId id="273" r:id="rId22"/>
+    <p:sldId id="278" r:id="rId23"/>
+    <p:sldId id="290" r:id="rId24"/>
   </p:sldIdLst>
   <p:sldSz cx="12192000" cy="6858000"/>
   <p:notesSz cx="6858000" cy="9144000"/>
@@ -125,6 +126,11 @@
       </a:defRPr>
     </a:lvl9pPr>
   </p:defaultTextStyle>
+  <p:extLst>
+    <p:ext uri="{EFAFB233-063F-42B5-8137-9DF3F51BA10A}">
+      <p15:sldGuideLst xmlns:p15="http://schemas.microsoft.com/office/powerpoint/2012/main"/>
+    </p:ext>
+  </p:extLst>
 </p:presentation>
 </file>
 
@@ -275,7 +281,7 @@
           <a:p>
             <a:fld id="{E837BFAA-8B15-4C36-BA82-87C92344ACBC}" type="datetimeFigureOut">
               <a:rPr lang="en-US" smtClean="0"/>
-              <a:t>12/7/2020</a:t>
+              <a:t>12/9/2020</a:t>
             </a:fld>
             <a:endParaRPr lang="en-US"/>
           </a:p>
@@ -473,7 +479,7 @@
           <a:p>
             <a:fld id="{E837BFAA-8B15-4C36-BA82-87C92344ACBC}" type="datetimeFigureOut">
               <a:rPr lang="en-US" smtClean="0"/>
-              <a:t>12/7/2020</a:t>
+              <a:t>12/9/2020</a:t>
             </a:fld>
             <a:endParaRPr lang="en-US"/>
           </a:p>
@@ -681,7 +687,7 @@
           <a:p>
             <a:fld id="{E837BFAA-8B15-4C36-BA82-87C92344ACBC}" type="datetimeFigureOut">
               <a:rPr lang="en-US" smtClean="0"/>
-              <a:t>12/7/2020</a:t>
+              <a:t>12/9/2020</a:t>
             </a:fld>
             <a:endParaRPr lang="en-US"/>
           </a:p>
@@ -879,7 +885,7 @@
           <a:p>
             <a:fld id="{E837BFAA-8B15-4C36-BA82-87C92344ACBC}" type="datetimeFigureOut">
               <a:rPr lang="en-US" smtClean="0"/>
-              <a:t>12/7/2020</a:t>
+              <a:t>12/9/2020</a:t>
             </a:fld>
             <a:endParaRPr lang="en-US"/>
           </a:p>
@@ -1154,7 +1160,7 @@
           <a:p>
             <a:fld id="{E837BFAA-8B15-4C36-BA82-87C92344ACBC}" type="datetimeFigureOut">
               <a:rPr lang="en-US" smtClean="0"/>
-              <a:t>12/7/2020</a:t>
+              <a:t>12/9/2020</a:t>
             </a:fld>
             <a:endParaRPr lang="en-US"/>
           </a:p>
@@ -1419,7 +1425,7 @@
           <a:p>
             <a:fld id="{E837BFAA-8B15-4C36-BA82-87C92344ACBC}" type="datetimeFigureOut">
               <a:rPr lang="en-US" smtClean="0"/>
-              <a:t>12/7/2020</a:t>
+              <a:t>12/9/2020</a:t>
             </a:fld>
             <a:endParaRPr lang="en-US"/>
           </a:p>
@@ -1831,7 +1837,7 @@
           <a:p>
             <a:fld id="{E837BFAA-8B15-4C36-BA82-87C92344ACBC}" type="datetimeFigureOut">
               <a:rPr lang="en-US" smtClean="0"/>
-              <a:t>12/7/2020</a:t>
+              <a:t>12/9/2020</a:t>
             </a:fld>
             <a:endParaRPr lang="en-US"/>
           </a:p>
@@ -1972,7 +1978,7 @@
           <a:p>
             <a:fld id="{E837BFAA-8B15-4C36-BA82-87C92344ACBC}" type="datetimeFigureOut">
               <a:rPr lang="en-US" smtClean="0"/>
-              <a:t>12/7/2020</a:t>
+              <a:t>12/9/2020</a:t>
             </a:fld>
             <a:endParaRPr lang="en-US"/>
           </a:p>
@@ -2085,7 +2091,7 @@
           <a:p>
             <a:fld id="{E837BFAA-8B15-4C36-BA82-87C92344ACBC}" type="datetimeFigureOut">
               <a:rPr lang="en-US" smtClean="0"/>
-              <a:t>12/7/2020</a:t>
+              <a:t>12/9/2020</a:t>
             </a:fld>
             <a:endParaRPr lang="en-US"/>
           </a:p>
@@ -2396,7 +2402,7 @@
           <a:p>
             <a:fld id="{E837BFAA-8B15-4C36-BA82-87C92344ACBC}" type="datetimeFigureOut">
               <a:rPr lang="en-US" smtClean="0"/>
-              <a:t>12/7/2020</a:t>
+              <a:t>12/9/2020</a:t>
             </a:fld>
             <a:endParaRPr lang="en-US"/>
           </a:p>
@@ -2684,7 +2690,7 @@
           <a:p>
             <a:fld id="{E837BFAA-8B15-4C36-BA82-87C92344ACBC}" type="datetimeFigureOut">
               <a:rPr lang="en-US" smtClean="0"/>
-              <a:t>12/7/2020</a:t>
+              <a:t>12/9/2020</a:t>
             </a:fld>
             <a:endParaRPr lang="en-US"/>
           </a:p>
@@ -2925,7 +2931,7 @@
           <a:p>
             <a:fld id="{E837BFAA-8B15-4C36-BA82-87C92344ACBC}" type="datetimeFigureOut">
               <a:rPr lang="en-US" smtClean="0"/>
-              <a:t>12/7/2020</a:t>
+              <a:t>12/9/2020</a:t>
             </a:fld>
             <a:endParaRPr lang="en-US"/>
           </a:p>
@@ -5828,253 +5834,61 @@
       </p:grpSpPr>
       <p:sp>
         <p:nvSpPr>
-          <p:cNvPr id="4" name="Rectangle 3">
-            <a:extLst>
-              <a:ext uri="{FF2B5EF4-FFF2-40B4-BE49-F238E27FC236}">
-                <a16:creationId xmlns:a16="http://schemas.microsoft.com/office/drawing/2014/main" id="{BCA023EF-6DE5-4AB6-AA20-00519413E246}"/>
-              </a:ext>
-            </a:extLst>
-          </p:cNvPr>
-          <p:cNvSpPr/>
-          <p:nvPr/>
-        </p:nvSpPr>
-        <p:spPr>
-          <a:xfrm>
-            <a:off x="7388607" y="1884947"/>
-            <a:ext cx="914400" cy="914400"/>
-          </a:xfrm>
-          <a:prstGeom prst="rect">
-            <a:avLst/>
-          </a:prstGeom>
-        </p:spPr>
-        <p:style>
-          <a:lnRef idx="2">
-            <a:schemeClr val="accent1">
-              <a:shade val="50000"/>
-            </a:schemeClr>
-          </a:lnRef>
-          <a:fillRef idx="1">
-            <a:schemeClr val="accent1"/>
-          </a:fillRef>
-          <a:effectRef idx="0">
-            <a:schemeClr val="accent1"/>
-          </a:effectRef>
-          <a:fontRef idx="minor">
-            <a:schemeClr val="lt1"/>
-          </a:fontRef>
-        </p:style>
-        <p:txBody>
-          <a:bodyPr rtlCol="0" anchor="ctr"/>
-          <a:lstStyle/>
-          <a:p>
-            <a:pPr algn="ctr"/>
-            <a:r>
-              <a:rPr lang="en-US" sz="4000" dirty="0"/>
-              <a:t>1</a:t>
-            </a:r>
-          </a:p>
-        </p:txBody>
-      </p:sp>
-      <p:sp>
-        <p:nvSpPr>
-          <p:cNvPr id="5" name="Rectangle 4">
-            <a:extLst>
-              <a:ext uri="{FF2B5EF4-FFF2-40B4-BE49-F238E27FC236}">
-                <a16:creationId xmlns:a16="http://schemas.microsoft.com/office/drawing/2014/main" id="{B28F00E9-9F21-495C-AA2E-DC042B301EE2}"/>
-              </a:ext>
-            </a:extLst>
-          </p:cNvPr>
-          <p:cNvSpPr/>
-          <p:nvPr/>
-        </p:nvSpPr>
-        <p:spPr>
-          <a:xfrm>
-            <a:off x="6249862" y="1875043"/>
-            <a:ext cx="914400" cy="914400"/>
-          </a:xfrm>
-          <a:prstGeom prst="rect">
-            <a:avLst/>
-          </a:prstGeom>
-        </p:spPr>
-        <p:style>
-          <a:lnRef idx="2">
-            <a:schemeClr val="accent1">
-              <a:shade val="50000"/>
-            </a:schemeClr>
-          </a:lnRef>
-          <a:fillRef idx="1">
-            <a:schemeClr val="accent1"/>
-          </a:fillRef>
-          <a:effectRef idx="0">
-            <a:schemeClr val="accent1"/>
-          </a:effectRef>
-          <a:fontRef idx="minor">
-            <a:schemeClr val="lt1"/>
-          </a:fontRef>
-        </p:style>
-        <p:txBody>
-          <a:bodyPr rtlCol="0" anchor="ctr"/>
-          <a:lstStyle/>
-          <a:p>
-            <a:pPr algn="ctr"/>
-            <a:r>
-              <a:rPr lang="en-US" sz="4000" dirty="0"/>
-              <a:t>2</a:t>
-            </a:r>
-          </a:p>
-        </p:txBody>
-      </p:sp>
-      <p:sp>
-        <p:nvSpPr>
-          <p:cNvPr id="6" name="Rectangle 5">
-            <a:extLst>
-              <a:ext uri="{FF2B5EF4-FFF2-40B4-BE49-F238E27FC236}">
-                <a16:creationId xmlns:a16="http://schemas.microsoft.com/office/drawing/2014/main" id="{80E79C57-7F6A-439B-9FED-7A69401D6A97}"/>
-              </a:ext>
-            </a:extLst>
-          </p:cNvPr>
-          <p:cNvSpPr/>
-          <p:nvPr/>
-        </p:nvSpPr>
-        <p:spPr>
-          <a:xfrm>
-            <a:off x="5111117" y="1875043"/>
-            <a:ext cx="914400" cy="914400"/>
-          </a:xfrm>
-          <a:prstGeom prst="rect">
-            <a:avLst/>
-          </a:prstGeom>
-        </p:spPr>
-        <p:style>
-          <a:lnRef idx="2">
-            <a:schemeClr val="accent1">
-              <a:shade val="50000"/>
-            </a:schemeClr>
-          </a:lnRef>
-          <a:fillRef idx="1">
-            <a:schemeClr val="accent1"/>
-          </a:fillRef>
-          <a:effectRef idx="0">
-            <a:schemeClr val="accent1"/>
-          </a:effectRef>
-          <a:fontRef idx="minor">
-            <a:schemeClr val="lt1"/>
-          </a:fontRef>
-        </p:style>
-        <p:txBody>
-          <a:bodyPr rtlCol="0" anchor="ctr"/>
-          <a:lstStyle/>
-          <a:p>
-            <a:pPr algn="ctr"/>
-            <a:r>
-              <a:rPr lang="en-US" sz="4000" dirty="0"/>
-              <a:t>3</a:t>
-            </a:r>
-          </a:p>
-        </p:txBody>
-      </p:sp>
-      <p:sp>
-        <p:nvSpPr>
-          <p:cNvPr id="7" name="Rectangle 6">
-            <a:extLst>
-              <a:ext uri="{FF2B5EF4-FFF2-40B4-BE49-F238E27FC236}">
-                <a16:creationId xmlns:a16="http://schemas.microsoft.com/office/drawing/2014/main" id="{105C2D9E-57CA-4D3D-AF6B-6A8AFF810EFF}"/>
-              </a:ext>
-            </a:extLst>
-          </p:cNvPr>
-          <p:cNvSpPr/>
-          <p:nvPr/>
-        </p:nvSpPr>
-        <p:spPr>
-          <a:xfrm>
-            <a:off x="3972372" y="1875043"/>
-            <a:ext cx="914400" cy="914400"/>
-          </a:xfrm>
-          <a:prstGeom prst="rect">
-            <a:avLst/>
-          </a:prstGeom>
-        </p:spPr>
-        <p:style>
-          <a:lnRef idx="2">
-            <a:schemeClr val="accent1">
-              <a:shade val="50000"/>
-            </a:schemeClr>
-          </a:lnRef>
-          <a:fillRef idx="1">
-            <a:schemeClr val="accent1"/>
-          </a:fillRef>
-          <a:effectRef idx="0">
-            <a:schemeClr val="accent1"/>
-          </a:effectRef>
-          <a:fontRef idx="minor">
-            <a:schemeClr val="lt1"/>
-          </a:fontRef>
-        </p:style>
-        <p:txBody>
-          <a:bodyPr rtlCol="0" anchor="ctr"/>
-          <a:lstStyle/>
-          <a:p>
-            <a:pPr algn="ctr"/>
-            <a:r>
-              <a:rPr lang="en-US" sz="4000" dirty="0"/>
-              <a:t>4</a:t>
-            </a:r>
-          </a:p>
-        </p:txBody>
-      </p:sp>
-      <p:sp>
-        <p:nvSpPr>
-          <p:cNvPr id="8" name="Rectangle 7">
-            <a:extLst>
-              <a:ext uri="{FF2B5EF4-FFF2-40B4-BE49-F238E27FC236}">
-                <a16:creationId xmlns:a16="http://schemas.microsoft.com/office/drawing/2014/main" id="{D632DBD7-2D66-4990-91E9-2DDB5DEB57B2}"/>
-              </a:ext>
-            </a:extLst>
-          </p:cNvPr>
-          <p:cNvSpPr/>
-          <p:nvPr/>
-        </p:nvSpPr>
-        <p:spPr>
-          <a:xfrm>
-            <a:off x="2826828" y="1875043"/>
-            <a:ext cx="914400" cy="914400"/>
-          </a:xfrm>
-          <a:prstGeom prst="rect">
-            <a:avLst/>
-          </a:prstGeom>
-        </p:spPr>
-        <p:style>
-          <a:lnRef idx="2">
-            <a:schemeClr val="accent1">
-              <a:shade val="50000"/>
-            </a:schemeClr>
-          </a:lnRef>
-          <a:fillRef idx="1">
-            <a:schemeClr val="accent1"/>
-          </a:fillRef>
-          <a:effectRef idx="0">
-            <a:schemeClr val="accent1"/>
-          </a:effectRef>
-          <a:fontRef idx="minor">
-            <a:schemeClr val="lt1"/>
-          </a:fontRef>
-        </p:style>
-        <p:txBody>
-          <a:bodyPr rtlCol="0" anchor="ctr"/>
-          <a:lstStyle/>
-          <a:p>
-            <a:pPr algn="ctr"/>
-            <a:r>
-              <a:rPr lang="en-US" sz="4000" dirty="0"/>
-              <a:t>5</a:t>
-            </a:r>
+          <p:cNvPr id="2" name="Title 1">
+            <a:extLst>
+              <a:ext uri="{FF2B5EF4-FFF2-40B4-BE49-F238E27FC236}">
+                <a16:creationId xmlns:a16="http://schemas.microsoft.com/office/drawing/2014/main" id="{01AB6C6A-D37C-42DE-AD73-1E68F234475B}"/>
+              </a:ext>
+            </a:extLst>
+          </p:cNvPr>
+          <p:cNvSpPr>
+            <a:spLocks noGrp="1"/>
+          </p:cNvSpPr>
+          <p:nvPr>
+            <p:ph type="title"/>
+          </p:nvPr>
+        </p:nvSpPr>
+        <p:spPr/>
+        <p:txBody>
+          <a:bodyPr/>
+          <a:lstStyle/>
+          <a:p>
+            <a:r>
+              <a:rPr lang="en-US" dirty="0"/>
+              <a:t>Merge Sort</a:t>
+            </a:r>
+          </a:p>
+        </p:txBody>
+      </p:sp>
+      <p:sp>
+        <p:nvSpPr>
+          <p:cNvPr id="3" name="Content Placeholder 2">
+            <a:extLst>
+              <a:ext uri="{FF2B5EF4-FFF2-40B4-BE49-F238E27FC236}">
+                <a16:creationId xmlns:a16="http://schemas.microsoft.com/office/drawing/2014/main" id="{A4AF7C76-304A-4116-BBF7-E7BC09F10EBC}"/>
+              </a:ext>
+            </a:extLst>
+          </p:cNvPr>
+          <p:cNvSpPr>
+            <a:spLocks noGrp="1"/>
+          </p:cNvSpPr>
+          <p:nvPr>
+            <p:ph idx="1"/>
+          </p:nvPr>
+        </p:nvSpPr>
+        <p:spPr/>
+        <p:txBody>
+          <a:bodyPr/>
+          <a:lstStyle/>
+          <a:p>
+            <a:endParaRPr lang="en-US"/>
           </a:p>
         </p:txBody>
       </p:sp>
     </p:spTree>
     <p:extLst>
       <p:ext uri="{BB962C8B-B14F-4D97-AF65-F5344CB8AC3E}">
-        <p14:creationId xmlns:p14="http://schemas.microsoft.com/office/powerpoint/2010/main" val="3015586693"/>
+        <p14:creationId xmlns:p14="http://schemas.microsoft.com/office/powerpoint/2010/main" val="2155933771"/>
       </p:ext>
     </p:extLst>
   </p:cSld>
@@ -6201,6 +6015,55 @@
       </p:sp>
       <p:sp>
         <p:nvSpPr>
+          <p:cNvPr id="6" name="Rectangle 5">
+            <a:extLst>
+              <a:ext uri="{FF2B5EF4-FFF2-40B4-BE49-F238E27FC236}">
+                <a16:creationId xmlns:a16="http://schemas.microsoft.com/office/drawing/2014/main" id="{80E79C57-7F6A-439B-9FED-7A69401D6A97}"/>
+              </a:ext>
+            </a:extLst>
+          </p:cNvPr>
+          <p:cNvSpPr/>
+          <p:nvPr/>
+        </p:nvSpPr>
+        <p:spPr>
+          <a:xfrm>
+            <a:off x="5111117" y="1875043"/>
+            <a:ext cx="914400" cy="914400"/>
+          </a:xfrm>
+          <a:prstGeom prst="rect">
+            <a:avLst/>
+          </a:prstGeom>
+        </p:spPr>
+        <p:style>
+          <a:lnRef idx="2">
+            <a:schemeClr val="accent1">
+              <a:shade val="50000"/>
+            </a:schemeClr>
+          </a:lnRef>
+          <a:fillRef idx="1">
+            <a:schemeClr val="accent1"/>
+          </a:fillRef>
+          <a:effectRef idx="0">
+            <a:schemeClr val="accent1"/>
+          </a:effectRef>
+          <a:fontRef idx="minor">
+            <a:schemeClr val="lt1"/>
+          </a:fontRef>
+        </p:style>
+        <p:txBody>
+          <a:bodyPr rtlCol="0" anchor="ctr"/>
+          <a:lstStyle/>
+          <a:p>
+            <a:pPr algn="ctr"/>
+            <a:r>
+              <a:rPr lang="en-US" sz="4000" dirty="0"/>
+              <a:t>3</a:t>
+            </a:r>
+          </a:p>
+        </p:txBody>
+      </p:sp>
+      <p:sp>
+        <p:nvSpPr>
           <p:cNvPr id="7" name="Rectangle 6">
             <a:extLst>
               <a:ext uri="{FF2B5EF4-FFF2-40B4-BE49-F238E27FC236}">
@@ -6242,8 +6105,8 @@
           <a:p>
             <a:pPr algn="ctr"/>
             <a:r>
-              <a:rPr lang="en-US" sz="3600" dirty="0"/>
-              <a:t>n+1</a:t>
+              <a:rPr lang="en-US" sz="4000" dirty="0"/>
+              <a:t>4</a:t>
             </a:r>
           </a:p>
         </p:txBody>
@@ -6292,43 +6155,7 @@
             <a:pPr algn="ctr"/>
             <a:r>
               <a:rPr lang="en-US" sz="4000" dirty="0"/>
-              <a:t>n</a:t>
-            </a:r>
-          </a:p>
-        </p:txBody>
-      </p:sp>
-      <p:sp>
-        <p:nvSpPr>
-          <p:cNvPr id="2" name="TextBox 1">
-            <a:extLst>
-              <a:ext uri="{FF2B5EF4-FFF2-40B4-BE49-F238E27FC236}">
-                <a16:creationId xmlns:a16="http://schemas.microsoft.com/office/drawing/2014/main" id="{C274DAE4-5FD5-4471-957E-CDA335594647}"/>
-              </a:ext>
-            </a:extLst>
-          </p:cNvPr>
-          <p:cNvSpPr txBox="1"/>
-          <p:nvPr/>
-        </p:nvSpPr>
-        <p:spPr>
-          <a:xfrm>
-            <a:off x="5393236" y="2157481"/>
-            <a:ext cx="343363" cy="369332"/>
-          </a:xfrm>
-          <a:prstGeom prst="rect">
-            <a:avLst/>
-          </a:prstGeom>
-          <a:noFill/>
-        </p:spPr>
-        <p:txBody>
-          <a:bodyPr wrap="none" rtlCol="0">
-            <a:spAutoFit/>
-          </a:bodyPr>
-          <a:lstStyle/>
-          <a:p>
-            <a:pPr algn="ctr"/>
-            <a:r>
-              <a:rPr lang="en-US" dirty="0"/>
-              <a:t>…</a:t>
+              <a:t>5</a:t>
             </a:r>
           </a:p>
         </p:txBody>
@@ -6336,7 +6163,7 @@
     </p:spTree>
     <p:extLst>
       <p:ext uri="{BB962C8B-B14F-4D97-AF65-F5344CB8AC3E}">
-        <p14:creationId xmlns:p14="http://schemas.microsoft.com/office/powerpoint/2010/main" val="1029232942"/>
+        <p14:creationId xmlns:p14="http://schemas.microsoft.com/office/powerpoint/2010/main" val="3015586693"/>
       </p:ext>
     </p:extLst>
   </p:cSld>
@@ -6377,7 +6204,7 @@
         </p:nvSpPr>
         <p:spPr>
           <a:xfrm>
-            <a:off x="2769704" y="1871974"/>
+            <a:off x="7388607" y="1884947"/>
             <a:ext cx="914400" cy="914400"/>
           </a:xfrm>
           <a:prstGeom prst="rect">
@@ -6426,7 +6253,7 @@
         </p:nvSpPr>
         <p:spPr>
           <a:xfrm>
-            <a:off x="3947822" y="1867022"/>
+            <a:off x="6249862" y="1875043"/>
             <a:ext cx="914400" cy="914400"/>
           </a:xfrm>
           <a:prstGeom prst="rect">
@@ -6463,19 +6290,19 @@
       </p:sp>
       <p:sp>
         <p:nvSpPr>
-          <p:cNvPr id="6" name="Rectangle 5">
-            <a:extLst>
-              <a:ext uri="{FF2B5EF4-FFF2-40B4-BE49-F238E27FC236}">
-                <a16:creationId xmlns:a16="http://schemas.microsoft.com/office/drawing/2014/main" id="{80E79C57-7F6A-439B-9FED-7A69401D6A97}"/>
-              </a:ext>
-            </a:extLst>
-          </p:cNvPr>
-          <p:cNvSpPr/>
-          <p:nvPr/>
-        </p:nvSpPr>
-        <p:spPr>
-          <a:xfrm>
-            <a:off x="5125940" y="1871974"/>
+          <p:cNvPr id="7" name="Rectangle 6">
+            <a:extLst>
+              <a:ext uri="{FF2B5EF4-FFF2-40B4-BE49-F238E27FC236}">
+                <a16:creationId xmlns:a16="http://schemas.microsoft.com/office/drawing/2014/main" id="{105C2D9E-57CA-4D3D-AF6B-6A8AFF810EFF}"/>
+              </a:ext>
+            </a:extLst>
+          </p:cNvPr>
+          <p:cNvSpPr/>
+          <p:nvPr/>
+        </p:nvSpPr>
+        <p:spPr>
+          <a:xfrm>
+            <a:off x="3972372" y="1875043"/>
             <a:ext cx="914400" cy="914400"/>
           </a:xfrm>
           <a:prstGeom prst="rect">
@@ -6504,106 +6331,93 @@
           <a:p>
             <a:pPr algn="ctr"/>
             <a:r>
+              <a:rPr lang="en-US" sz="3600" dirty="0"/>
+              <a:t>n+1</a:t>
+            </a:r>
+          </a:p>
+        </p:txBody>
+      </p:sp>
+      <p:sp>
+        <p:nvSpPr>
+          <p:cNvPr id="8" name="Rectangle 7">
+            <a:extLst>
+              <a:ext uri="{FF2B5EF4-FFF2-40B4-BE49-F238E27FC236}">
+                <a16:creationId xmlns:a16="http://schemas.microsoft.com/office/drawing/2014/main" id="{D632DBD7-2D66-4990-91E9-2DDB5DEB57B2}"/>
+              </a:ext>
+            </a:extLst>
+          </p:cNvPr>
+          <p:cNvSpPr/>
+          <p:nvPr/>
+        </p:nvSpPr>
+        <p:spPr>
+          <a:xfrm>
+            <a:off x="2826828" y="1875043"/>
+            <a:ext cx="914400" cy="914400"/>
+          </a:xfrm>
+          <a:prstGeom prst="rect">
+            <a:avLst/>
+          </a:prstGeom>
+        </p:spPr>
+        <p:style>
+          <a:lnRef idx="2">
+            <a:schemeClr val="accent1">
+              <a:shade val="50000"/>
+            </a:schemeClr>
+          </a:lnRef>
+          <a:fillRef idx="1">
+            <a:schemeClr val="accent1"/>
+          </a:fillRef>
+          <a:effectRef idx="0">
+            <a:schemeClr val="accent1"/>
+          </a:effectRef>
+          <a:fontRef idx="minor">
+            <a:schemeClr val="lt1"/>
+          </a:fontRef>
+        </p:style>
+        <p:txBody>
+          <a:bodyPr rtlCol="0" anchor="ctr"/>
+          <a:lstStyle/>
+          <a:p>
+            <a:pPr algn="ctr"/>
+            <a:r>
               <a:rPr lang="en-US" sz="4000" dirty="0"/>
-              <a:t>3</a:t>
-            </a:r>
-          </a:p>
-        </p:txBody>
-      </p:sp>
-      <p:sp>
-        <p:nvSpPr>
-          <p:cNvPr id="7" name="Rectangle 6">
-            <a:extLst>
-              <a:ext uri="{FF2B5EF4-FFF2-40B4-BE49-F238E27FC236}">
-                <a16:creationId xmlns:a16="http://schemas.microsoft.com/office/drawing/2014/main" id="{105C2D9E-57CA-4D3D-AF6B-6A8AFF810EFF}"/>
-              </a:ext>
-            </a:extLst>
-          </p:cNvPr>
-          <p:cNvSpPr/>
-          <p:nvPr/>
-        </p:nvSpPr>
-        <p:spPr>
-          <a:xfrm>
-            <a:off x="6304058" y="1871974"/>
-            <a:ext cx="914400" cy="914400"/>
-          </a:xfrm>
-          <a:prstGeom prst="rect">
-            <a:avLst/>
-          </a:prstGeom>
-        </p:spPr>
-        <p:style>
-          <a:lnRef idx="2">
-            <a:schemeClr val="accent1">
-              <a:shade val="50000"/>
-            </a:schemeClr>
-          </a:lnRef>
-          <a:fillRef idx="1">
-            <a:schemeClr val="accent1"/>
-          </a:fillRef>
-          <a:effectRef idx="0">
-            <a:schemeClr val="accent1"/>
-          </a:effectRef>
-          <a:fontRef idx="minor">
-            <a:schemeClr val="lt1"/>
-          </a:fontRef>
-        </p:style>
-        <p:txBody>
-          <a:bodyPr rtlCol="0" anchor="ctr"/>
-          <a:lstStyle/>
-          <a:p>
-            <a:pPr algn="ctr"/>
-            <a:r>
-              <a:rPr lang="en-US" sz="4000" dirty="0"/>
-              <a:t>4</a:t>
-            </a:r>
-          </a:p>
-        </p:txBody>
-      </p:sp>
-      <p:sp>
-        <p:nvSpPr>
-          <p:cNvPr id="8" name="Rectangle 7">
-            <a:extLst>
-              <a:ext uri="{FF2B5EF4-FFF2-40B4-BE49-F238E27FC236}">
-                <a16:creationId xmlns:a16="http://schemas.microsoft.com/office/drawing/2014/main" id="{D632DBD7-2D66-4990-91E9-2DDB5DEB57B2}"/>
-              </a:ext>
-            </a:extLst>
-          </p:cNvPr>
-          <p:cNvSpPr/>
-          <p:nvPr/>
-        </p:nvSpPr>
-        <p:spPr>
-          <a:xfrm>
-            <a:off x="7482176" y="1871974"/>
-            <a:ext cx="914400" cy="914400"/>
-          </a:xfrm>
-          <a:prstGeom prst="rect">
-            <a:avLst/>
-          </a:prstGeom>
-        </p:spPr>
-        <p:style>
-          <a:lnRef idx="2">
-            <a:schemeClr val="accent1">
-              <a:shade val="50000"/>
-            </a:schemeClr>
-          </a:lnRef>
-          <a:fillRef idx="1">
-            <a:schemeClr val="accent1"/>
-          </a:fillRef>
-          <a:effectRef idx="0">
-            <a:schemeClr val="accent1"/>
-          </a:effectRef>
-          <a:fontRef idx="minor">
-            <a:schemeClr val="lt1"/>
-          </a:fontRef>
-        </p:style>
-        <p:txBody>
-          <a:bodyPr rtlCol="0" anchor="ctr"/>
-          <a:lstStyle/>
-          <a:p>
-            <a:pPr algn="ctr"/>
-            <a:r>
-              <a:rPr lang="en-US" sz="4000" dirty="0"/>
-              <a:t>5</a:t>
+              <a:t>n</a:t>
+            </a:r>
+          </a:p>
+        </p:txBody>
+      </p:sp>
+      <p:sp>
+        <p:nvSpPr>
+          <p:cNvPr id="2" name="TextBox 1">
+            <a:extLst>
+              <a:ext uri="{FF2B5EF4-FFF2-40B4-BE49-F238E27FC236}">
+                <a16:creationId xmlns:a16="http://schemas.microsoft.com/office/drawing/2014/main" id="{C274DAE4-5FD5-4471-957E-CDA335594647}"/>
+              </a:ext>
+            </a:extLst>
+          </p:cNvPr>
+          <p:cNvSpPr txBox="1"/>
+          <p:nvPr/>
+        </p:nvSpPr>
+        <p:spPr>
+          <a:xfrm>
+            <a:off x="5393236" y="2157481"/>
+            <a:ext cx="343363" cy="369332"/>
+          </a:xfrm>
+          <a:prstGeom prst="rect">
+            <a:avLst/>
+          </a:prstGeom>
+          <a:noFill/>
+        </p:spPr>
+        <p:txBody>
+          <a:bodyPr wrap="none" rtlCol="0">
+            <a:spAutoFit/>
+          </a:bodyPr>
+          <a:lstStyle/>
+          <a:p>
+            <a:pPr algn="ctr"/>
+            <a:r>
+              <a:rPr lang="en-US" dirty="0"/>
+              <a:t>…</a:t>
             </a:r>
           </a:p>
         </p:txBody>
@@ -6611,7 +6425,7 @@
     </p:spTree>
     <p:extLst>
       <p:ext uri="{BB962C8B-B14F-4D97-AF65-F5344CB8AC3E}">
-        <p14:creationId xmlns:p14="http://schemas.microsoft.com/office/powerpoint/2010/main" val="1041943517"/>
+        <p14:creationId xmlns:p14="http://schemas.microsoft.com/office/powerpoint/2010/main" val="1029232942"/>
       </p:ext>
     </p:extLst>
   </p:cSld>
@@ -6723,61 +6537,253 @@
       </p:grpSpPr>
       <p:sp>
         <p:nvSpPr>
-          <p:cNvPr id="2" name="Title 1">
-            <a:extLst>
-              <a:ext uri="{FF2B5EF4-FFF2-40B4-BE49-F238E27FC236}">
-                <a16:creationId xmlns:a16="http://schemas.microsoft.com/office/drawing/2014/main" id="{DCAA3750-1F04-4F59-8BDA-B91FA436A238}"/>
-              </a:ext>
-            </a:extLst>
-          </p:cNvPr>
-          <p:cNvSpPr>
-            <a:spLocks noGrp="1"/>
-          </p:cNvSpPr>
-          <p:nvPr>
-            <p:ph type="title"/>
-          </p:nvPr>
-        </p:nvSpPr>
-        <p:spPr/>
-        <p:txBody>
-          <a:bodyPr/>
-          <a:lstStyle/>
-          <a:p>
-            <a:r>
-              <a:rPr lang="en-US" dirty="0"/>
-              <a:t>Merge Sort</a:t>
-            </a:r>
-          </a:p>
-        </p:txBody>
-      </p:sp>
-      <p:sp>
-        <p:nvSpPr>
-          <p:cNvPr id="3" name="Content Placeholder 2">
-            <a:extLst>
-              <a:ext uri="{FF2B5EF4-FFF2-40B4-BE49-F238E27FC236}">
-                <a16:creationId xmlns:a16="http://schemas.microsoft.com/office/drawing/2014/main" id="{327C8162-0DD4-4F30-A57B-7EA5E79D77C6}"/>
-              </a:ext>
-            </a:extLst>
-          </p:cNvPr>
-          <p:cNvSpPr>
-            <a:spLocks noGrp="1"/>
-          </p:cNvSpPr>
-          <p:nvPr>
-            <p:ph idx="1"/>
-          </p:nvPr>
-        </p:nvSpPr>
-        <p:spPr/>
-        <p:txBody>
-          <a:bodyPr/>
-          <a:lstStyle/>
-          <a:p>
-            <a:endParaRPr lang="en-US"/>
+          <p:cNvPr id="4" name="Rectangle 3">
+            <a:extLst>
+              <a:ext uri="{FF2B5EF4-FFF2-40B4-BE49-F238E27FC236}">
+                <a16:creationId xmlns:a16="http://schemas.microsoft.com/office/drawing/2014/main" id="{BCA023EF-6DE5-4AB6-AA20-00519413E246}"/>
+              </a:ext>
+            </a:extLst>
+          </p:cNvPr>
+          <p:cNvSpPr/>
+          <p:nvPr/>
+        </p:nvSpPr>
+        <p:spPr>
+          <a:xfrm>
+            <a:off x="2769704" y="1871974"/>
+            <a:ext cx="914400" cy="914400"/>
+          </a:xfrm>
+          <a:prstGeom prst="rect">
+            <a:avLst/>
+          </a:prstGeom>
+        </p:spPr>
+        <p:style>
+          <a:lnRef idx="2">
+            <a:schemeClr val="accent1">
+              <a:shade val="50000"/>
+            </a:schemeClr>
+          </a:lnRef>
+          <a:fillRef idx="1">
+            <a:schemeClr val="accent1"/>
+          </a:fillRef>
+          <a:effectRef idx="0">
+            <a:schemeClr val="accent1"/>
+          </a:effectRef>
+          <a:fontRef idx="minor">
+            <a:schemeClr val="lt1"/>
+          </a:fontRef>
+        </p:style>
+        <p:txBody>
+          <a:bodyPr rtlCol="0" anchor="ctr"/>
+          <a:lstStyle/>
+          <a:p>
+            <a:pPr algn="ctr"/>
+            <a:r>
+              <a:rPr lang="en-US" sz="4000" dirty="0"/>
+              <a:t>1</a:t>
+            </a:r>
+          </a:p>
+        </p:txBody>
+      </p:sp>
+      <p:sp>
+        <p:nvSpPr>
+          <p:cNvPr id="5" name="Rectangle 4">
+            <a:extLst>
+              <a:ext uri="{FF2B5EF4-FFF2-40B4-BE49-F238E27FC236}">
+                <a16:creationId xmlns:a16="http://schemas.microsoft.com/office/drawing/2014/main" id="{B28F00E9-9F21-495C-AA2E-DC042B301EE2}"/>
+              </a:ext>
+            </a:extLst>
+          </p:cNvPr>
+          <p:cNvSpPr/>
+          <p:nvPr/>
+        </p:nvSpPr>
+        <p:spPr>
+          <a:xfrm>
+            <a:off x="3947822" y="1867022"/>
+            <a:ext cx="914400" cy="914400"/>
+          </a:xfrm>
+          <a:prstGeom prst="rect">
+            <a:avLst/>
+          </a:prstGeom>
+        </p:spPr>
+        <p:style>
+          <a:lnRef idx="2">
+            <a:schemeClr val="accent1">
+              <a:shade val="50000"/>
+            </a:schemeClr>
+          </a:lnRef>
+          <a:fillRef idx="1">
+            <a:schemeClr val="accent1"/>
+          </a:fillRef>
+          <a:effectRef idx="0">
+            <a:schemeClr val="accent1"/>
+          </a:effectRef>
+          <a:fontRef idx="minor">
+            <a:schemeClr val="lt1"/>
+          </a:fontRef>
+        </p:style>
+        <p:txBody>
+          <a:bodyPr rtlCol="0" anchor="ctr"/>
+          <a:lstStyle/>
+          <a:p>
+            <a:pPr algn="ctr"/>
+            <a:r>
+              <a:rPr lang="en-US" sz="4000" dirty="0"/>
+              <a:t>2</a:t>
+            </a:r>
+          </a:p>
+        </p:txBody>
+      </p:sp>
+      <p:sp>
+        <p:nvSpPr>
+          <p:cNvPr id="6" name="Rectangle 5">
+            <a:extLst>
+              <a:ext uri="{FF2B5EF4-FFF2-40B4-BE49-F238E27FC236}">
+                <a16:creationId xmlns:a16="http://schemas.microsoft.com/office/drawing/2014/main" id="{80E79C57-7F6A-439B-9FED-7A69401D6A97}"/>
+              </a:ext>
+            </a:extLst>
+          </p:cNvPr>
+          <p:cNvSpPr/>
+          <p:nvPr/>
+        </p:nvSpPr>
+        <p:spPr>
+          <a:xfrm>
+            <a:off x="5125940" y="1871974"/>
+            <a:ext cx="914400" cy="914400"/>
+          </a:xfrm>
+          <a:prstGeom prst="rect">
+            <a:avLst/>
+          </a:prstGeom>
+        </p:spPr>
+        <p:style>
+          <a:lnRef idx="2">
+            <a:schemeClr val="accent1">
+              <a:shade val="50000"/>
+            </a:schemeClr>
+          </a:lnRef>
+          <a:fillRef idx="1">
+            <a:schemeClr val="accent1"/>
+          </a:fillRef>
+          <a:effectRef idx="0">
+            <a:schemeClr val="accent1"/>
+          </a:effectRef>
+          <a:fontRef idx="minor">
+            <a:schemeClr val="lt1"/>
+          </a:fontRef>
+        </p:style>
+        <p:txBody>
+          <a:bodyPr rtlCol="0" anchor="ctr"/>
+          <a:lstStyle/>
+          <a:p>
+            <a:pPr algn="ctr"/>
+            <a:r>
+              <a:rPr lang="en-US" sz="4000" dirty="0"/>
+              <a:t>3</a:t>
+            </a:r>
+          </a:p>
+        </p:txBody>
+      </p:sp>
+      <p:sp>
+        <p:nvSpPr>
+          <p:cNvPr id="7" name="Rectangle 6">
+            <a:extLst>
+              <a:ext uri="{FF2B5EF4-FFF2-40B4-BE49-F238E27FC236}">
+                <a16:creationId xmlns:a16="http://schemas.microsoft.com/office/drawing/2014/main" id="{105C2D9E-57CA-4D3D-AF6B-6A8AFF810EFF}"/>
+              </a:ext>
+            </a:extLst>
+          </p:cNvPr>
+          <p:cNvSpPr/>
+          <p:nvPr/>
+        </p:nvSpPr>
+        <p:spPr>
+          <a:xfrm>
+            <a:off x="6304058" y="1871974"/>
+            <a:ext cx="914400" cy="914400"/>
+          </a:xfrm>
+          <a:prstGeom prst="rect">
+            <a:avLst/>
+          </a:prstGeom>
+        </p:spPr>
+        <p:style>
+          <a:lnRef idx="2">
+            <a:schemeClr val="accent1">
+              <a:shade val="50000"/>
+            </a:schemeClr>
+          </a:lnRef>
+          <a:fillRef idx="1">
+            <a:schemeClr val="accent1"/>
+          </a:fillRef>
+          <a:effectRef idx="0">
+            <a:schemeClr val="accent1"/>
+          </a:effectRef>
+          <a:fontRef idx="minor">
+            <a:schemeClr val="lt1"/>
+          </a:fontRef>
+        </p:style>
+        <p:txBody>
+          <a:bodyPr rtlCol="0" anchor="ctr"/>
+          <a:lstStyle/>
+          <a:p>
+            <a:pPr algn="ctr"/>
+            <a:r>
+              <a:rPr lang="en-US" sz="4000" dirty="0"/>
+              <a:t>4</a:t>
+            </a:r>
+          </a:p>
+        </p:txBody>
+      </p:sp>
+      <p:sp>
+        <p:nvSpPr>
+          <p:cNvPr id="8" name="Rectangle 7">
+            <a:extLst>
+              <a:ext uri="{FF2B5EF4-FFF2-40B4-BE49-F238E27FC236}">
+                <a16:creationId xmlns:a16="http://schemas.microsoft.com/office/drawing/2014/main" id="{D632DBD7-2D66-4990-91E9-2DDB5DEB57B2}"/>
+              </a:ext>
+            </a:extLst>
+          </p:cNvPr>
+          <p:cNvSpPr/>
+          <p:nvPr/>
+        </p:nvSpPr>
+        <p:spPr>
+          <a:xfrm>
+            <a:off x="7482176" y="1871974"/>
+            <a:ext cx="914400" cy="914400"/>
+          </a:xfrm>
+          <a:prstGeom prst="rect">
+            <a:avLst/>
+          </a:prstGeom>
+        </p:spPr>
+        <p:style>
+          <a:lnRef idx="2">
+            <a:schemeClr val="accent1">
+              <a:shade val="50000"/>
+            </a:schemeClr>
+          </a:lnRef>
+          <a:fillRef idx="1">
+            <a:schemeClr val="accent1"/>
+          </a:fillRef>
+          <a:effectRef idx="0">
+            <a:schemeClr val="accent1"/>
+          </a:effectRef>
+          <a:fontRef idx="minor">
+            <a:schemeClr val="lt1"/>
+          </a:fontRef>
+        </p:style>
+        <p:txBody>
+          <a:bodyPr rtlCol="0" anchor="ctr"/>
+          <a:lstStyle/>
+          <a:p>
+            <a:pPr algn="ctr"/>
+            <a:r>
+              <a:rPr lang="en-US" sz="4000" dirty="0"/>
+              <a:t>5</a:t>
+            </a:r>
           </a:p>
         </p:txBody>
       </p:sp>
     </p:spTree>
     <p:extLst>
       <p:ext uri="{BB962C8B-B14F-4D97-AF65-F5344CB8AC3E}">
-        <p14:creationId xmlns:p14="http://schemas.microsoft.com/office/powerpoint/2010/main" val="389588428"/>
+        <p14:creationId xmlns:p14="http://schemas.microsoft.com/office/powerpoint/2010/main" val="1041943517"/>
       </p:ext>
     </p:extLst>
   </p:cSld>
@@ -6806,6 +6812,89 @@
       </p:grpSpPr>
       <p:sp>
         <p:nvSpPr>
+          <p:cNvPr id="2" name="Title 1">
+            <a:extLst>
+              <a:ext uri="{FF2B5EF4-FFF2-40B4-BE49-F238E27FC236}">
+                <a16:creationId xmlns:a16="http://schemas.microsoft.com/office/drawing/2014/main" id="{DCAA3750-1F04-4F59-8BDA-B91FA436A238}"/>
+              </a:ext>
+            </a:extLst>
+          </p:cNvPr>
+          <p:cNvSpPr>
+            <a:spLocks noGrp="1"/>
+          </p:cNvSpPr>
+          <p:nvPr>
+            <p:ph type="title"/>
+          </p:nvPr>
+        </p:nvSpPr>
+        <p:spPr/>
+        <p:txBody>
+          <a:bodyPr/>
+          <a:lstStyle/>
+          <a:p>
+            <a:r>
+              <a:rPr lang="en-US" dirty="0"/>
+              <a:t>Merge Sort</a:t>
+            </a:r>
+          </a:p>
+        </p:txBody>
+      </p:sp>
+      <p:sp>
+        <p:nvSpPr>
+          <p:cNvPr id="3" name="Content Placeholder 2">
+            <a:extLst>
+              <a:ext uri="{FF2B5EF4-FFF2-40B4-BE49-F238E27FC236}">
+                <a16:creationId xmlns:a16="http://schemas.microsoft.com/office/drawing/2014/main" id="{327C8162-0DD4-4F30-A57B-7EA5E79D77C6}"/>
+              </a:ext>
+            </a:extLst>
+          </p:cNvPr>
+          <p:cNvSpPr>
+            <a:spLocks noGrp="1"/>
+          </p:cNvSpPr>
+          <p:nvPr>
+            <p:ph idx="1"/>
+          </p:nvPr>
+        </p:nvSpPr>
+        <p:spPr/>
+        <p:txBody>
+          <a:bodyPr/>
+          <a:lstStyle/>
+          <a:p>
+            <a:endParaRPr lang="en-US"/>
+          </a:p>
+        </p:txBody>
+      </p:sp>
+    </p:spTree>
+    <p:extLst>
+      <p:ext uri="{BB962C8B-B14F-4D97-AF65-F5344CB8AC3E}">
+        <p14:creationId xmlns:p14="http://schemas.microsoft.com/office/powerpoint/2010/main" val="389588428"/>
+      </p:ext>
+    </p:extLst>
+  </p:cSld>
+  <p:clrMapOvr>
+    <a:masterClrMapping/>
+  </p:clrMapOvr>
+</p:sld>
+</file>
+
+<file path=ppt/slides/slide22.xml><?xml version="1.0" encoding="utf-8"?>
+<p:sld xmlns:a="http://schemas.openxmlformats.org/drawingml/2006/main" xmlns:r="http://schemas.openxmlformats.org/officeDocument/2006/relationships" xmlns:p="http://schemas.openxmlformats.org/presentationml/2006/main">
+  <p:cSld>
+    <p:spTree>
+      <p:nvGrpSpPr>
+        <p:cNvPr id="1" name=""/>
+        <p:cNvGrpSpPr/>
+        <p:nvPr/>
+      </p:nvGrpSpPr>
+      <p:grpSpPr>
+        <a:xfrm>
+          <a:off x="0" y="0"/>
+          <a:ext cx="0" cy="0"/>
+          <a:chOff x="0" y="0"/>
+          <a:chExt cx="0" cy="0"/>
+        </a:xfrm>
+      </p:grpSpPr>
+      <p:sp>
+        <p:nvSpPr>
           <p:cNvPr id="4" name="Rectangle 3">
             <a:extLst>
               <a:ext uri="{FF2B5EF4-FFF2-40B4-BE49-F238E27FC236}">
@@ -7797,7 +7886,7 @@
 </p:sld>
 </file>
 
-<file path=ppt/slides/slide22.xml><?xml version="1.0" encoding="utf-8"?>
+<file path=ppt/slides/slide23.xml><?xml version="1.0" encoding="utf-8"?>
 <p:sld xmlns:a="http://schemas.openxmlformats.org/drawingml/2006/main" xmlns:r="http://schemas.openxmlformats.org/officeDocument/2006/relationships" xmlns:p="http://schemas.openxmlformats.org/presentationml/2006/main">
   <p:cSld>
     <p:spTree>

</xml_diff>